<commit_message>
[update] añadido la grafica en results y primer draft de discusion
</commit_message>
<xml_diff>
--- a/The toxicity of the Star Wars fandom on social media.pptx
+++ b/The toxicity of the Star Wars fandom on social media.pptx
@@ -537,23 +537,15 @@
               <a:defRPr/>
             </a:pPr>
             <a:r>
-              <a:rPr lang="en-US" dirty="0" smtClean="0"/>
-              <a:t>Suppose we have a collection of documents and we want to determine the most relevant document to the query “the </a:t>
-            </a:r>
-            <a:r>
-              <a:rPr lang="en-US" sz="1200" dirty="0" smtClean="0"/>
-              <a:t>quick brown fox</a:t>
-            </a:r>
-            <a:r>
-              <a:rPr lang="en-US" dirty="0" smtClean="0"/>
-              <a:t>". A simple way to start is to eliminate those documents that do not contain the three words "the", “quick“, “brown” and “fox", but there are still many documents. To differentiate them further, we must count the number of times each term occurs in each document and add them; The number of times a term occurs in a document is called its term frequency (</a:t>
-            </a:r>
-            <a:r>
-              <a:rPr lang="en-US" dirty="0" err="1" smtClean="0"/>
+              <a:rPr lang="en-US" sz="1000" dirty="0" smtClean="0"/>
+              <a:t>Suppose we have a collection of documents and we want to determine the most relevant document to the query “the quick brown fox". A simple way to start is to eliminate those documents that do not contain the three words "the", “quick“, “brown” and “fox", but there are still many documents. To differentiate them further, we must count the number of times each term occurs in each document and add them; The number of times a term occurs in a document is called its term frequency (</a:t>
+            </a:r>
+            <a:r>
+              <a:rPr lang="en-US" sz="1000" dirty="0" err="1" smtClean="0"/>
               <a:t>tf</a:t>
             </a:r>
             <a:r>
-              <a:rPr lang="en-US" dirty="0" smtClean="0"/>
+              <a:rPr lang="en-US" sz="1000" dirty="0" smtClean="0"/>
               <a:t>).</a:t>
             </a:r>
           </a:p>
@@ -5083,6 +5075,13 @@
   <p:clrMapOvr>
     <a:masterClrMapping/>
   </p:clrMapOvr>
+  <p:timing>
+    <p:tnLst>
+      <p:par>
+        <p:cTn id="1" dur="indefinite" restart="never" nodeType="tmRoot"/>
+      </p:par>
+    </p:tnLst>
+  </p:timing>
 </p:sld>
 </file>
 
@@ -5164,702 +5163,28 @@
           <a:lstStyle/>
           <a:p>
             <a:r>
-              <a:rPr lang="es-MX" dirty="0" err="1"/>
-              <a:t>With</a:t>
-            </a:r>
-            <a:r>
-              <a:rPr lang="es-MX" dirty="0"/>
-              <a:t> </a:t>
-            </a:r>
-            <a:r>
-              <a:rPr lang="es-MX" dirty="0" err="1"/>
-              <a:t>the</a:t>
-            </a:r>
-            <a:r>
-              <a:rPr lang="es-MX" dirty="0"/>
-              <a:t> </a:t>
-            </a:r>
-            <a:r>
-              <a:rPr lang="es-MX" dirty="0" err="1"/>
-              <a:t>growth</a:t>
-            </a:r>
-            <a:r>
-              <a:rPr lang="es-MX" dirty="0"/>
-              <a:t> </a:t>
-            </a:r>
-            <a:r>
-              <a:rPr lang="es-MX" dirty="0" err="1"/>
-              <a:t>of</a:t>
-            </a:r>
-            <a:r>
-              <a:rPr lang="es-MX" dirty="0"/>
-              <a:t> </a:t>
-            </a:r>
-            <a:r>
-              <a:rPr lang="es-MX" dirty="0" err="1"/>
-              <a:t>the</a:t>
-            </a:r>
-            <a:r>
-              <a:rPr lang="es-MX" dirty="0"/>
-              <a:t> internet and social </a:t>
-            </a:r>
-            <a:r>
-              <a:rPr lang="es-MX" dirty="0" err="1"/>
-              <a:t>networks</a:t>
-            </a:r>
-            <a:r>
-              <a:rPr lang="es-MX" dirty="0"/>
-              <a:t>, </a:t>
-            </a:r>
-            <a:r>
-              <a:rPr lang="es-MX" dirty="0" err="1"/>
-              <a:t>people</a:t>
-            </a:r>
-            <a:r>
-              <a:rPr lang="es-MX" dirty="0"/>
-              <a:t> are </a:t>
-            </a:r>
-            <a:r>
-              <a:rPr lang="es-MX" dirty="0" err="1"/>
-              <a:t>continuously</a:t>
-            </a:r>
-            <a:r>
-              <a:rPr lang="es-MX" dirty="0"/>
-              <a:t> </a:t>
-            </a:r>
-            <a:r>
-              <a:rPr lang="es-MX" dirty="0" err="1"/>
-              <a:t>exchanging</a:t>
-            </a:r>
-            <a:r>
-              <a:rPr lang="es-MX" dirty="0"/>
-              <a:t> </a:t>
-            </a:r>
-            <a:r>
-              <a:rPr lang="es-MX" dirty="0" err="1"/>
-              <a:t>opinions</a:t>
-            </a:r>
-            <a:r>
-              <a:rPr lang="es-MX" dirty="0"/>
-              <a:t>. </a:t>
-            </a:r>
-            <a:r>
-              <a:rPr lang="es-MX" dirty="0" err="1"/>
-              <a:t>However</a:t>
-            </a:r>
-            <a:r>
-              <a:rPr lang="es-MX" dirty="0"/>
-              <a:t>, </a:t>
-            </a:r>
-            <a:r>
-              <a:rPr lang="es-MX" dirty="0" err="1"/>
-              <a:t>factors</a:t>
-            </a:r>
-            <a:r>
-              <a:rPr lang="es-MX" dirty="0"/>
-              <a:t> </a:t>
-            </a:r>
-            <a:r>
-              <a:rPr lang="es-MX" dirty="0" err="1"/>
-              <a:t>like</a:t>
-            </a:r>
-            <a:r>
-              <a:rPr lang="es-MX" dirty="0"/>
-              <a:t> </a:t>
-            </a:r>
-            <a:r>
-              <a:rPr lang="es-MX" dirty="0" err="1"/>
-              <a:t>anonymity</a:t>
-            </a:r>
-            <a:r>
-              <a:rPr lang="es-MX" dirty="0"/>
-              <a:t> and a </a:t>
-            </a:r>
-            <a:r>
-              <a:rPr lang="es-MX" dirty="0" err="1"/>
-              <a:t>lack</a:t>
-            </a:r>
-            <a:r>
-              <a:rPr lang="es-MX" dirty="0"/>
-              <a:t> </a:t>
-            </a:r>
-            <a:r>
-              <a:rPr lang="es-MX" dirty="0" err="1"/>
-              <a:t>of</a:t>
-            </a:r>
-            <a:r>
-              <a:rPr lang="es-MX" dirty="0"/>
-              <a:t> </a:t>
-            </a:r>
-            <a:r>
-              <a:rPr lang="es-MX" dirty="0" err="1"/>
-              <a:t>empathy</a:t>
-            </a:r>
-            <a:r>
-              <a:rPr lang="es-MX" dirty="0"/>
-              <a:t> </a:t>
-            </a:r>
-            <a:r>
-              <a:rPr lang="es-MX" dirty="0" err="1"/>
-              <a:t>have</a:t>
-            </a:r>
-            <a:r>
-              <a:rPr lang="es-MX" dirty="0"/>
-              <a:t> </a:t>
-            </a:r>
-            <a:r>
-              <a:rPr lang="es-MX" dirty="0" err="1"/>
-              <a:t>caused</a:t>
-            </a:r>
-            <a:r>
-              <a:rPr lang="es-MX" dirty="0"/>
-              <a:t> </a:t>
-            </a:r>
-            <a:r>
-              <a:rPr lang="es-MX" dirty="0" err="1"/>
-              <a:t>an</a:t>
-            </a:r>
-            <a:r>
-              <a:rPr lang="es-MX" dirty="0"/>
-              <a:t> </a:t>
-            </a:r>
-            <a:r>
-              <a:rPr lang="es-MX" dirty="0" err="1"/>
-              <a:t>unchecked</a:t>
-            </a:r>
-            <a:r>
-              <a:rPr lang="es-MX" dirty="0"/>
-              <a:t> </a:t>
-            </a:r>
-            <a:r>
-              <a:rPr lang="es-MX" dirty="0" err="1"/>
-              <a:t>freedom</a:t>
-            </a:r>
-            <a:r>
-              <a:rPr lang="es-MX" dirty="0"/>
-              <a:t> </a:t>
-            </a:r>
-            <a:r>
-              <a:rPr lang="es-MX" dirty="0" err="1"/>
-              <a:t>of</a:t>
-            </a:r>
-            <a:r>
-              <a:rPr lang="es-MX" dirty="0"/>
-              <a:t> </a:t>
-            </a:r>
-            <a:r>
-              <a:rPr lang="es-MX" dirty="0" err="1"/>
-              <a:t>speech</a:t>
-            </a:r>
-            <a:r>
-              <a:rPr lang="es-MX" dirty="0"/>
-              <a:t> </a:t>
-            </a:r>
-            <a:r>
-              <a:rPr lang="es-MX" dirty="0" err="1"/>
-              <a:t>which</a:t>
-            </a:r>
-            <a:r>
-              <a:rPr lang="es-MX" dirty="0"/>
-              <a:t> </a:t>
-            </a:r>
-            <a:r>
-              <a:rPr lang="es-MX" dirty="0" err="1"/>
-              <a:t>quickly</a:t>
-            </a:r>
-            <a:r>
-              <a:rPr lang="es-MX" dirty="0"/>
-              <a:t> </a:t>
-            </a:r>
-            <a:r>
-              <a:rPr lang="es-MX" dirty="0" err="1"/>
-              <a:t>turns</a:t>
-            </a:r>
-            <a:r>
-              <a:rPr lang="es-MX" dirty="0"/>
-              <a:t> </a:t>
-            </a:r>
-            <a:r>
-              <a:rPr lang="es-MX" dirty="0" err="1"/>
-              <a:t>into</a:t>
-            </a:r>
-            <a:r>
-              <a:rPr lang="es-MX" dirty="0"/>
-              <a:t> </a:t>
-            </a:r>
-            <a:r>
-              <a:rPr lang="es-MX" dirty="0" err="1"/>
-              <a:t>cyberbullying</a:t>
-            </a:r>
-            <a:r>
-              <a:rPr lang="es-MX" dirty="0"/>
-              <a:t> </a:t>
-            </a:r>
-            <a:r>
-              <a:rPr lang="es-MX" dirty="0" err="1"/>
-              <a:t>through</a:t>
-            </a:r>
-            <a:r>
-              <a:rPr lang="es-MX" dirty="0"/>
-              <a:t> </a:t>
-            </a:r>
-            <a:r>
-              <a:rPr lang="es-MX" dirty="0" err="1"/>
+              <a:rPr lang="en-US" dirty="0" smtClean="0"/>
+              <a:t>With the growth of the internet and social networks, people are continuously exchanging opinions. However, factors like anonymity and a lack of empathy have caused an unchecked freedom of speech which quickly turns into cyberbullying through </a:t>
+            </a:r>
+            <a:r>
+              <a:rPr lang="en-US" dirty="0" err="1" smtClean="0"/>
               <a:t>hatespeech</a:t>
             </a:r>
             <a:r>
-              <a:rPr lang="es-MX" dirty="0"/>
-              <a:t>, </a:t>
-            </a:r>
-            <a:r>
-              <a:rPr lang="es-MX" dirty="0" err="1"/>
-              <a:t>mysoginy</a:t>
-            </a:r>
-            <a:r>
-              <a:rPr lang="es-MX" dirty="0"/>
-              <a:t>, </a:t>
-            </a:r>
-            <a:r>
-              <a:rPr lang="es-MX" dirty="0" err="1"/>
-              <a:t>racism</a:t>
-            </a:r>
-            <a:r>
-              <a:rPr lang="es-MX" dirty="0"/>
-              <a:t> and </a:t>
-            </a:r>
-            <a:r>
-              <a:rPr lang="es-MX" dirty="0" err="1"/>
-              <a:t>other</a:t>
-            </a:r>
-            <a:r>
-              <a:rPr lang="es-MX" dirty="0"/>
-              <a:t> </a:t>
-            </a:r>
-            <a:r>
-              <a:rPr lang="es-MX" dirty="0" err="1"/>
-              <a:t>forms</a:t>
-            </a:r>
-            <a:r>
-              <a:rPr lang="es-MX" dirty="0"/>
-              <a:t> </a:t>
-            </a:r>
-            <a:r>
-              <a:rPr lang="es-MX" dirty="0" err="1"/>
-              <a:t>of</a:t>
-            </a:r>
-            <a:r>
-              <a:rPr lang="es-MX" dirty="0"/>
-              <a:t> </a:t>
-            </a:r>
-            <a:r>
-              <a:rPr lang="es-MX" dirty="0" err="1"/>
-              <a:t>toxic</a:t>
-            </a:r>
-            <a:r>
-              <a:rPr lang="es-MX" dirty="0"/>
-              <a:t> </a:t>
-            </a:r>
-            <a:r>
-              <a:rPr lang="es-MX" dirty="0" err="1"/>
-              <a:t>interactions</a:t>
-            </a:r>
-            <a:r>
-              <a:rPr lang="es-MX" dirty="0"/>
-              <a:t>.</a:t>
-            </a:r>
-          </a:p>
-          <a:p>
-            <a:r>
-              <a:rPr lang="es-MX" dirty="0" err="1"/>
-              <a:t>It’s</a:t>
-            </a:r>
-            <a:r>
-              <a:rPr lang="es-MX" dirty="0"/>
-              <a:t> crucial </a:t>
-            </a:r>
-            <a:r>
-              <a:rPr lang="es-MX" dirty="0" err="1"/>
-              <a:t>to</a:t>
-            </a:r>
-            <a:r>
-              <a:rPr lang="es-MX" dirty="0"/>
-              <a:t> </a:t>
-            </a:r>
-            <a:r>
-              <a:rPr lang="es-MX" dirty="0" err="1"/>
-              <a:t>keep</a:t>
-            </a:r>
-            <a:r>
-              <a:rPr lang="es-MX" dirty="0"/>
-              <a:t> a </a:t>
-            </a:r>
-            <a:r>
-              <a:rPr lang="es-MX" dirty="0" err="1"/>
-              <a:t>healthy</a:t>
-            </a:r>
-            <a:r>
-              <a:rPr lang="es-MX" dirty="0"/>
-              <a:t> </a:t>
-            </a:r>
-            <a:r>
-              <a:rPr lang="es-MX" dirty="0" err="1"/>
-              <a:t>environment</a:t>
-            </a:r>
-            <a:r>
-              <a:rPr lang="es-MX" dirty="0"/>
-              <a:t> </a:t>
-            </a:r>
-            <a:r>
-              <a:rPr lang="es-MX" dirty="0" err="1"/>
-              <a:t>on</a:t>
-            </a:r>
-            <a:r>
-              <a:rPr lang="es-MX" dirty="0"/>
-              <a:t> </a:t>
-            </a:r>
-            <a:r>
-              <a:rPr lang="es-MX" dirty="0" err="1"/>
-              <a:t>these</a:t>
-            </a:r>
-            <a:r>
-              <a:rPr lang="es-MX" dirty="0"/>
-              <a:t> online </a:t>
-            </a:r>
-            <a:r>
-              <a:rPr lang="es-MX" dirty="0" err="1"/>
-              <a:t>platforms</a:t>
-            </a:r>
-            <a:r>
-              <a:rPr lang="es-MX" dirty="0"/>
-              <a:t>. </a:t>
-            </a:r>
-            <a:r>
-              <a:rPr lang="es-MX" dirty="0" err="1"/>
-              <a:t>Studies</a:t>
-            </a:r>
-            <a:r>
-              <a:rPr lang="es-MX" dirty="0"/>
-              <a:t> relate social media </a:t>
-            </a:r>
-            <a:r>
-              <a:rPr lang="es-MX" dirty="0" err="1"/>
-              <a:t>screen</a:t>
-            </a:r>
-            <a:r>
-              <a:rPr lang="es-MX" dirty="0"/>
-              <a:t> time </a:t>
-            </a:r>
-            <a:r>
-              <a:rPr lang="es-MX" dirty="0" err="1"/>
-              <a:t>with</a:t>
-            </a:r>
-            <a:r>
-              <a:rPr lang="es-MX" dirty="0"/>
-              <a:t> </a:t>
-            </a:r>
-            <a:r>
-              <a:rPr lang="es-MX" dirty="0" err="1"/>
-              <a:t>increases</a:t>
-            </a:r>
-            <a:r>
-              <a:rPr lang="es-MX" dirty="0"/>
-              <a:t> in </a:t>
-            </a:r>
-            <a:r>
-              <a:rPr lang="es-MX" dirty="0" err="1"/>
-              <a:t>depressive</a:t>
-            </a:r>
-            <a:r>
-              <a:rPr lang="es-MX" dirty="0"/>
-              <a:t> </a:t>
-            </a:r>
-            <a:r>
-              <a:rPr lang="es-MX" dirty="0" err="1"/>
-              <a:t>sympthoms</a:t>
-            </a:r>
-            <a:r>
-              <a:rPr lang="es-MX" dirty="0"/>
-              <a:t> and suicide </a:t>
-            </a:r>
-            <a:r>
-              <a:rPr lang="es-MX" dirty="0" err="1"/>
-              <a:t>rates</a:t>
-            </a:r>
-            <a:r>
-              <a:rPr lang="es-MX" dirty="0"/>
-              <a:t> in </a:t>
-            </a:r>
-            <a:r>
-              <a:rPr lang="es-MX" dirty="0" err="1"/>
-              <a:t>the</a:t>
-            </a:r>
-            <a:r>
-              <a:rPr lang="es-MX" dirty="0"/>
-              <a:t> </a:t>
-            </a:r>
-            <a:r>
-              <a:rPr lang="es-MX" dirty="0" err="1"/>
-              <a:t>United</a:t>
-            </a:r>
-            <a:r>
-              <a:rPr lang="es-MX" dirty="0"/>
-              <a:t> </a:t>
-            </a:r>
-            <a:r>
-              <a:rPr lang="es-MX" dirty="0" err="1"/>
-              <a:t>States</a:t>
-            </a:r>
-            <a:r>
-              <a:rPr lang="es-MX" dirty="0"/>
-              <a:t> [1].</a:t>
-            </a:r>
-          </a:p>
-          <a:p>
-            <a:r>
-              <a:rPr lang="es-MX" dirty="0" err="1"/>
-              <a:t>Due</a:t>
-            </a:r>
-            <a:r>
-              <a:rPr lang="es-MX" dirty="0"/>
-              <a:t> </a:t>
-            </a:r>
-            <a:r>
-              <a:rPr lang="es-MX" dirty="0" err="1"/>
-              <a:t>to</a:t>
-            </a:r>
-            <a:r>
-              <a:rPr lang="es-MX" dirty="0"/>
-              <a:t> </a:t>
-            </a:r>
-            <a:r>
-              <a:rPr lang="es-MX" dirty="0" err="1"/>
-              <a:t>the</a:t>
-            </a:r>
-            <a:r>
-              <a:rPr lang="es-MX" dirty="0"/>
-              <a:t> </a:t>
-            </a:r>
-            <a:r>
-              <a:rPr lang="es-MX" dirty="0" err="1"/>
-              <a:t>large</a:t>
-            </a:r>
-            <a:r>
-              <a:rPr lang="es-MX" dirty="0"/>
-              <a:t> </a:t>
-            </a:r>
-            <a:r>
-              <a:rPr lang="es-MX" dirty="0" err="1"/>
-              <a:t>amount</a:t>
-            </a:r>
-            <a:r>
-              <a:rPr lang="es-MX" dirty="0"/>
-              <a:t> </a:t>
-            </a:r>
-            <a:r>
-              <a:rPr lang="es-MX" dirty="0" err="1"/>
-              <a:t>of</a:t>
-            </a:r>
-            <a:r>
-              <a:rPr lang="es-MX" dirty="0"/>
-              <a:t> </a:t>
-            </a:r>
-            <a:r>
-              <a:rPr lang="es-MX" dirty="0" err="1"/>
-              <a:t>content</a:t>
-            </a:r>
-            <a:r>
-              <a:rPr lang="es-MX" dirty="0"/>
-              <a:t> </a:t>
-            </a:r>
-            <a:r>
-              <a:rPr lang="es-MX" dirty="0" err="1"/>
-              <a:t>published</a:t>
-            </a:r>
-            <a:r>
-              <a:rPr lang="es-MX" dirty="0"/>
-              <a:t> online </a:t>
-            </a:r>
-            <a:r>
-              <a:rPr lang="es-MX" dirty="0" err="1"/>
-              <a:t>every</a:t>
-            </a:r>
-            <a:r>
-              <a:rPr lang="es-MX" dirty="0"/>
-              <a:t> </a:t>
-            </a:r>
-            <a:r>
-              <a:rPr lang="es-MX" dirty="0" err="1"/>
-              <a:t>moment</a:t>
-            </a:r>
-            <a:r>
-              <a:rPr lang="es-MX" dirty="0"/>
-              <a:t>, </a:t>
-            </a:r>
-            <a:r>
-              <a:rPr lang="es-MX" dirty="0" err="1"/>
-              <a:t>is</a:t>
-            </a:r>
-            <a:r>
-              <a:rPr lang="es-MX" dirty="0"/>
-              <a:t> </a:t>
-            </a:r>
-            <a:r>
-              <a:rPr lang="es-MX" dirty="0" err="1"/>
-              <a:t>nearly</a:t>
-            </a:r>
-            <a:r>
-              <a:rPr lang="es-MX" dirty="0"/>
-              <a:t> imposible </a:t>
-            </a:r>
-            <a:r>
-              <a:rPr lang="es-MX" dirty="0" err="1"/>
-              <a:t>to</a:t>
-            </a:r>
-            <a:r>
-              <a:rPr lang="es-MX" dirty="0"/>
-              <a:t> </a:t>
-            </a:r>
-            <a:r>
-              <a:rPr lang="es-MX" dirty="0" err="1"/>
-              <a:t>keep</a:t>
-            </a:r>
-            <a:r>
-              <a:rPr lang="es-MX" dirty="0"/>
-              <a:t> social media </a:t>
-            </a:r>
-            <a:r>
-              <a:rPr lang="es-MX" dirty="0" err="1"/>
-              <a:t>platforms</a:t>
-            </a:r>
-            <a:r>
-              <a:rPr lang="es-MX" dirty="0"/>
-              <a:t> </a:t>
-            </a:r>
-            <a:r>
-              <a:rPr lang="es-MX" dirty="0" err="1"/>
-              <a:t>healthy</a:t>
-            </a:r>
-            <a:r>
-              <a:rPr lang="es-MX" dirty="0"/>
-              <a:t> </a:t>
-            </a:r>
-            <a:r>
-              <a:rPr lang="es-MX" dirty="0" err="1"/>
-              <a:t>by</a:t>
-            </a:r>
-            <a:r>
-              <a:rPr lang="es-MX" dirty="0"/>
-              <a:t> </a:t>
-            </a:r>
-            <a:r>
-              <a:rPr lang="es-MX" dirty="0" err="1"/>
-              <a:t>detecting</a:t>
-            </a:r>
-            <a:r>
-              <a:rPr lang="es-MX" dirty="0"/>
-              <a:t> and </a:t>
-            </a:r>
-            <a:r>
-              <a:rPr lang="es-MX" dirty="0" err="1"/>
-              <a:t>removing</a:t>
-            </a:r>
-            <a:r>
-              <a:rPr lang="es-MX" dirty="0"/>
-              <a:t> </a:t>
-            </a:r>
-            <a:r>
-              <a:rPr lang="es-MX" dirty="0" err="1"/>
-              <a:t>such</a:t>
-            </a:r>
-            <a:r>
-              <a:rPr lang="es-MX" dirty="0"/>
-              <a:t> </a:t>
-            </a:r>
-            <a:r>
-              <a:rPr lang="es-MX" dirty="0" err="1"/>
-              <a:t>content</a:t>
-            </a:r>
-            <a:r>
-              <a:rPr lang="es-MX" dirty="0"/>
-              <a:t> </a:t>
-            </a:r>
-            <a:r>
-              <a:rPr lang="es-MX" dirty="0" err="1"/>
-              <a:t>manually</a:t>
-            </a:r>
-            <a:r>
-              <a:rPr lang="es-MX" dirty="0"/>
-              <a:t>.</a:t>
-            </a:r>
-          </a:p>
-          <a:p>
-            <a:r>
-              <a:rPr lang="es-MX" dirty="0"/>
-              <a:t>Can </a:t>
-            </a:r>
-            <a:r>
-              <a:rPr lang="es-MX" dirty="0" err="1"/>
-              <a:t>we</a:t>
-            </a:r>
-            <a:r>
-              <a:rPr lang="es-MX" dirty="0"/>
-              <a:t> use Machine </a:t>
-            </a:r>
-            <a:r>
-              <a:rPr lang="es-MX" dirty="0" err="1"/>
-              <a:t>Learning</a:t>
-            </a:r>
-            <a:r>
-              <a:rPr lang="es-MX" dirty="0"/>
-              <a:t> </a:t>
-            </a:r>
-            <a:r>
-              <a:rPr lang="es-MX" dirty="0" err="1"/>
-              <a:t>techniques</a:t>
-            </a:r>
-            <a:r>
-              <a:rPr lang="es-MX" dirty="0"/>
-              <a:t> </a:t>
-            </a:r>
-            <a:r>
-              <a:rPr lang="es-MX" dirty="0" err="1"/>
-              <a:t>to</a:t>
-            </a:r>
-            <a:r>
-              <a:rPr lang="es-MX" dirty="0"/>
-              <a:t> </a:t>
-            </a:r>
-            <a:r>
-              <a:rPr lang="es-MX" dirty="0" err="1"/>
-              <a:t>detect</a:t>
-            </a:r>
-            <a:r>
-              <a:rPr lang="es-MX" dirty="0"/>
-              <a:t> </a:t>
-            </a:r>
-            <a:r>
-              <a:rPr lang="es-MX" dirty="0" err="1"/>
-              <a:t>hate</a:t>
-            </a:r>
-            <a:r>
-              <a:rPr lang="es-MX" dirty="0"/>
-              <a:t> </a:t>
-            </a:r>
-            <a:r>
-              <a:rPr lang="es-MX" dirty="0" err="1"/>
-              <a:t>speech</a:t>
-            </a:r>
-            <a:r>
-              <a:rPr lang="es-MX" dirty="0"/>
-              <a:t> </a:t>
-            </a:r>
-            <a:r>
-              <a:rPr lang="es-MX" dirty="0" err="1"/>
-              <a:t>on</a:t>
-            </a:r>
-            <a:r>
-              <a:rPr lang="es-MX" dirty="0"/>
-              <a:t> social media?</a:t>
+              <a:rPr lang="en-US" dirty="0" smtClean="0"/>
+              <a:t>, misogyny, racism and other forms of toxic interactions.</a:t>
+            </a:r>
+          </a:p>
+          <a:p>
+            <a:r>
+              <a:rPr lang="en-US" dirty="0" smtClean="0"/>
+              <a:t>It’s crucial to keep a healthy environment on these online platforms. Studies relate social media screen time with increases in depressive symptoms and suicide rates.[1]</a:t>
+            </a:r>
+          </a:p>
+          <a:p>
+            <a:r>
+              <a:rPr lang="en-US" dirty="0" smtClean="0"/>
+              <a:t>Can we use Machine Learning techniques to detect hate speech on social media?</a:t>
             </a:r>
           </a:p>
           <a:p>
@@ -5935,6 +5260,13 @@
   <p:clrMapOvr>
     <a:masterClrMapping/>
   </p:clrMapOvr>
+  <p:timing>
+    <p:tnLst>
+      <p:par>
+        <p:cTn id="1" dur="indefinite" restart="never" nodeType="tmRoot"/>
+      </p:par>
+    </p:tnLst>
+  </p:timing>
 </p:sld>
 </file>
 
@@ -6019,21 +5351,18 @@
               <a:t>The dataset for building the model is </a:t>
             </a:r>
             <a:r>
-              <a:rPr lang="en-US" dirty="0" err="1"/>
-              <a:t>publicy</a:t>
+              <a:rPr lang="en-US" dirty="0" smtClean="0"/>
+              <a:t>publicly </a:t>
             </a:r>
             <a:r>
               <a:rPr lang="en-US" dirty="0"/>
-              <a:t> available at </a:t>
-            </a:r>
-            <a:r>
-              <a:rPr lang="en-US" dirty="0" err="1"/>
-              <a:t>Crowdflower</a:t>
-            </a:r>
-            <a:r>
-              <a:rPr lang="en-US" dirty="0"/>
-              <a:t>. It has also been used in [2] and [3].</a:t>
-            </a:r>
+              <a:t>available at Crowdflower. </a:t>
+            </a:r>
+            <a:r>
+              <a:rPr lang="en-US" dirty="0" smtClean="0"/>
+              <a:t>It has also been used in [2] and [3].</a:t>
+            </a:r>
+            <a:endParaRPr lang="en-US" dirty="0"/>
           </a:p>
           <a:p>
             <a:pPr lvl="1"/>
@@ -6042,12 +5371,16 @@
               <a:t>This </a:t>
             </a:r>
             <a:r>
-              <a:rPr lang="en-US" dirty="0" err="1"/>
+              <a:rPr lang="en-US" dirty="0" err="1" smtClean="0"/>
               <a:t>datset</a:t>
             </a:r>
             <a:r>
+              <a:rPr lang="en-US" dirty="0" smtClean="0"/>
+              <a:t> </a:t>
+            </a:r>
+            <a:r>
               <a:rPr lang="en-US" dirty="0"/>
-              <a:t> contains 25k tweets manually classified as ‘hateful’, ‘offensive’ and ‘clean’.</a:t>
+              <a:t>contains 25k tweets manually classified as ‘hateful’, ‘offensive’ and ‘clean’.</a:t>
             </a:r>
           </a:p>
           <a:p>
@@ -6242,7 +5575,6 @@
               <a:rPr lang="en-US" sz="1600" dirty="0"/>
               <a:t>)</a:t>
             </a:r>
-            <a:endParaRPr lang="en-US" sz="1600" dirty="0"/>
           </a:p>
         </p:txBody>
       </p:sp>
@@ -6313,7 +5645,6 @@
               <a:rPr lang="en-US" dirty="0"/>
               <a:t> value increases proportionally to the number of times a word appears in the document and is offset by the number of documents in the corpus that contain the word, which helps to adjust for the fact that some words appear more frequently in general</a:t>
             </a:r>
-            <a:endParaRPr lang="en-US" dirty="0"/>
           </a:p>
         </p:txBody>
       </p:sp>
@@ -6448,8 +5779,8 @@
           </a:p>
         </p:txBody>
       </p:sp>
-      <mc:AlternateContent xmlns:mc="http://schemas.openxmlformats.org/markup-compatibility/2006">
-        <mc:Choice xmlns:a14="http://schemas.microsoft.com/office/drawing/2010/main" Requires="a14">
+      <mc:AlternateContent xmlns:mc="http://schemas.openxmlformats.org/markup-compatibility/2006" xmlns:a14="http://schemas.microsoft.com/office/drawing/2010/main">
+        <mc:Choice Requires="a14">
           <p:sp>
             <p:nvSpPr>
               <p:cNvPr id="3" name="Marcador de contenido 2">
@@ -7099,7 +6430,7 @@
             </p:txBody>
           </p:sp>
         </mc:Choice>
-        <mc:Fallback>
+        <mc:Fallback xmlns="">
           <p:sp>
             <p:nvSpPr>
               <p:cNvPr id="3" name="Marcador de contenido 2">
@@ -9405,16 +8736,12 @@
               <a:t> tickets </a:t>
             </a:r>
             <a:r>
-              <a:rPr lang="es-MX" sz="4800" dirty="0" err="1"/>
+              <a:rPr lang="es-MX" sz="4800" dirty="0" err="1" smtClean="0"/>
               <a:t>soon</a:t>
             </a:r>
             <a:r>
-              <a:rPr lang="es-MX" sz="4800" dirty="0"/>
-              <a:t>  &gt; </a:t>
-            </a:r>
-            <a:r>
               <a:rPr lang="es-MX" sz="4800" dirty="0" smtClean="0"/>
-              <a:t>VERB</a:t>
+              <a:t> </a:t>
             </a:r>
           </a:p>
           <a:p>
@@ -9462,13 +8789,10 @@
               <a:t> </a:t>
             </a:r>
             <a:r>
-              <a:rPr lang="es-MX" sz="4800" dirty="0" err="1"/>
+              <a:rPr lang="es-MX" sz="4800" dirty="0" err="1" smtClean="0"/>
               <a:t>soon</a:t>
             </a:r>
-            <a:r>
-              <a:rPr lang="es-MX" sz="4800" dirty="0"/>
-              <a:t>  &gt; NOUN</a:t>
-            </a:r>
+            <a:endParaRPr lang="es-MX" sz="4800" dirty="0"/>
           </a:p>
           <a:p>
             <a:pPr marL="0" indent="0">
@@ -9731,6 +9055,64 @@
               <a:t>______</a:t>
             </a:r>
             <a:endParaRPr lang="es-MX" sz="3200" dirty="0"/>
+          </a:p>
+        </p:txBody>
+      </p:sp>
+      <p:sp>
+        <p:nvSpPr>
+          <p:cNvPr id="7" name="CuadroTexto 6"/>
+          <p:cNvSpPr txBox="1"/>
+          <p:nvPr/>
+        </p:nvSpPr>
+        <p:spPr>
+          <a:xfrm>
+            <a:off x="7097820" y="2785211"/>
+            <a:ext cx="1189972" cy="461665"/>
+          </a:xfrm>
+          <a:prstGeom prst="rect">
+            <a:avLst/>
+          </a:prstGeom>
+          <a:noFill/>
+        </p:spPr>
+        <p:txBody>
+          <a:bodyPr wrap="square" rtlCol="0">
+            <a:spAutoFit/>
+          </a:bodyPr>
+          <a:lstStyle/>
+          <a:p>
+            <a:r>
+              <a:rPr lang="es-MX" sz="2400" b="1" dirty="0"/>
+              <a:t>&gt; VERB</a:t>
+            </a:r>
+          </a:p>
+        </p:txBody>
+      </p:sp>
+      <p:sp>
+        <p:nvSpPr>
+          <p:cNvPr id="8" name="CuadroTexto 7"/>
+          <p:cNvSpPr txBox="1"/>
+          <p:nvPr/>
+        </p:nvSpPr>
+        <p:spPr>
+          <a:xfrm>
+            <a:off x="6970209" y="3789574"/>
+            <a:ext cx="1317583" cy="461665"/>
+          </a:xfrm>
+          <a:prstGeom prst="rect">
+            <a:avLst/>
+          </a:prstGeom>
+          <a:noFill/>
+        </p:spPr>
+        <p:txBody>
+          <a:bodyPr wrap="square" rtlCol="0">
+            <a:spAutoFit/>
+          </a:bodyPr>
+          <a:lstStyle/>
+          <a:p>
+            <a:r>
+              <a:rPr lang="es-MX" sz="2400" b="1" dirty="0"/>
+              <a:t>&gt; NOUN</a:t>
+            </a:r>
           </a:p>
         </p:txBody>
       </p:sp>
@@ -9850,7 +9232,7 @@
                                     <p:cond delay="0"/>
                                   </p:stCondLst>
                                   <p:childTnLst>
-                                    <p:animMotion origin="layout" path="M 0.06953 4.44444E-6 L 0.09466 0.04004 C 0.1 0.04907 0.10781 0.05393 0.11627 0.05393 C 0.12578 0.05393 0.13346 0.04907 0.1388 0.04004 L 0.16445 4.44444E-6 " pathEditMode="relative" rAng="0" ptsTypes="AAAAA">
+                                    <p:animMotion origin="layout" path="M 0.03802 4.44444E-6 L 0.06315 0.02453 C 0.06849 0.03032 0.0763 0.03333 0.08476 0.03333 C 0.09427 0.03333 0.10195 0.03032 0.10729 0.02453 L 0.13294 4.44444E-6 " pathEditMode="relative" rAng="0" ptsTypes="AAAAA">
                                       <p:cBhvr>
                                         <p:cTn id="14" dur="2000" fill="hold"/>
                                         <p:tgtEl>
@@ -9861,7 +9243,7 @@
                                           <p:attrName>ppt_y</p:attrName>
                                         </p:attrNameLst>
                                       </p:cBhvr>
-                                      <p:rCtr x="4740" y="2685"/>
+                                      <p:rCtr x="4740" y="1667"/>
                                     </p:animMotion>
                                   </p:childTnLst>
                                 </p:cTn>
@@ -9952,6 +9334,104 @@
                       </p:childTnLst>
                     </p:cTn>
                   </p:par>
+                  <p:par>
+                    <p:cTn id="23" fill="hold">
+                      <p:stCondLst>
+                        <p:cond delay="indefinite"/>
+                      </p:stCondLst>
+                      <p:childTnLst>
+                        <p:par>
+                          <p:cTn id="24" fill="hold">
+                            <p:stCondLst>
+                              <p:cond delay="0"/>
+                            </p:stCondLst>
+                            <p:childTnLst>
+                              <p:par>
+                                <p:cTn id="25" presetID="1" presetClass="entr" presetSubtype="0" fill="hold" grpId="0" nodeType="clickEffect">
+                                  <p:stCondLst>
+                                    <p:cond delay="0"/>
+                                  </p:stCondLst>
+                                  <p:childTnLst>
+                                    <p:set>
+                                      <p:cBhvr>
+                                        <p:cTn id="26" dur="1" fill="hold">
+                                          <p:stCondLst>
+                                            <p:cond delay="0"/>
+                                          </p:stCondLst>
+                                        </p:cTn>
+                                        <p:tgtEl>
+                                          <p:spTgt spid="7"/>
+                                        </p:tgtEl>
+                                        <p:attrNameLst>
+                                          <p:attrName>style.visibility</p:attrName>
+                                        </p:attrNameLst>
+                                      </p:cBhvr>
+                                      <p:to>
+                                        <p:strVal val="visible"/>
+                                      </p:to>
+                                    </p:set>
+                                  </p:childTnLst>
+                                </p:cTn>
+                              </p:par>
+                            </p:childTnLst>
+                          </p:cTn>
+                        </p:par>
+                      </p:childTnLst>
+                    </p:cTn>
+                  </p:par>
+                  <p:par>
+                    <p:cTn id="27" fill="hold">
+                      <p:stCondLst>
+                        <p:cond delay="indefinite"/>
+                      </p:stCondLst>
+                      <p:childTnLst>
+                        <p:par>
+                          <p:cTn id="28" fill="hold">
+                            <p:stCondLst>
+                              <p:cond delay="0"/>
+                            </p:stCondLst>
+                            <p:childTnLst>
+                              <p:par>
+                                <p:cTn id="29" presetID="10" presetClass="entr" presetSubtype="0" fill="hold" grpId="0" nodeType="clickEffect">
+                                  <p:stCondLst>
+                                    <p:cond delay="0"/>
+                                  </p:stCondLst>
+                                  <p:childTnLst>
+                                    <p:set>
+                                      <p:cBhvr>
+                                        <p:cTn id="30" dur="1" fill="hold">
+                                          <p:stCondLst>
+                                            <p:cond delay="0"/>
+                                          </p:stCondLst>
+                                        </p:cTn>
+                                        <p:tgtEl>
+                                          <p:spTgt spid="8"/>
+                                        </p:tgtEl>
+                                        <p:attrNameLst>
+                                          <p:attrName>style.visibility</p:attrName>
+                                        </p:attrNameLst>
+                                      </p:cBhvr>
+                                      <p:to>
+                                        <p:strVal val="visible"/>
+                                      </p:to>
+                                    </p:set>
+                                    <p:animEffect transition="in" filter="fade">
+                                      <p:cBhvr>
+                                        <p:cTn id="31" dur="500"/>
+                                        <p:tgtEl>
+                                          <p:spTgt spid="8"/>
+                                        </p:tgtEl>
+                                      </p:cBhvr>
+                                    </p:animEffect>
+                                  </p:childTnLst>
+                                </p:cTn>
+                              </p:par>
+                            </p:childTnLst>
+                          </p:cTn>
+                        </p:par>
+                      </p:childTnLst>
+                    </p:cTn>
+                  </p:par>
                 </p:childTnLst>
               </p:cTn>
               <p:prevCondLst>
@@ -9979,6 +9459,8 @@
       <p:bldP spid="6" grpId="2"/>
       <p:bldP spid="6" grpId="3"/>
       <p:bldP spid="6" grpId="4"/>
+      <p:bldP spid="7" grpId="0"/>
+      <p:bldP spid="8" grpId="0"/>
     </p:bldLst>
   </p:timing>
 </p:sld>
@@ -10030,15 +9512,67 @@
           </a:p>
         </p:txBody>
       </p:sp>
-      <p:pic>
-        <p:nvPicPr>
-          <p:cNvPr id="6" name="Marcador de contenido 5">
+      <p:sp>
+        <p:nvSpPr>
+          <p:cNvPr id="4" name="Marcador de pie de página 3">
             <a:extLst>
               <a:ext uri="{FF2B5EF4-FFF2-40B4-BE49-F238E27FC236}">
-                <a16:creationId xmlns:a16="http://schemas.microsoft.com/office/drawing/2014/main" id="{AC07AAF3-9F0B-485B-BC70-52274412740D}"/>
+                <a16:creationId xmlns:a16="http://schemas.microsoft.com/office/drawing/2014/main" id="{71425969-D9F1-4AD9-AD3A-DD04E882EC19}"/>
               </a:ext>
             </a:extLst>
           </p:cNvPr>
+          <p:cNvSpPr>
+            <a:spLocks noGrp="1"/>
+          </p:cNvSpPr>
+          <p:nvPr>
+            <p:ph type="ftr" sz="quarter" idx="11"/>
+          </p:nvPr>
+        </p:nvSpPr>
+        <p:spPr/>
+        <p:txBody>
+          <a:bodyPr/>
+          <a:lstStyle/>
+          <a:p>
+            <a:r>
+              <a:rPr lang="en-US"/>
+              <a:t>November 26th, 2019</a:t>
+            </a:r>
+            <a:endParaRPr lang="en-US" dirty="0"/>
+          </a:p>
+        </p:txBody>
+      </p:sp>
+      <p:sp>
+        <p:nvSpPr>
+          <p:cNvPr id="5" name="Marcador de número de diapositiva 4">
+            <a:extLst>
+              <a:ext uri="{FF2B5EF4-FFF2-40B4-BE49-F238E27FC236}">
+                <a16:creationId xmlns:a16="http://schemas.microsoft.com/office/drawing/2014/main" id="{64A3C2AA-7BA2-426F-B970-2480DA90A086}"/>
+              </a:ext>
+            </a:extLst>
+          </p:cNvPr>
+          <p:cNvSpPr>
+            <a:spLocks noGrp="1"/>
+          </p:cNvSpPr>
+          <p:nvPr>
+            <p:ph type="sldNum" sz="quarter" idx="12"/>
+          </p:nvPr>
+        </p:nvSpPr>
+        <p:spPr/>
+        <p:txBody>
+          <a:bodyPr/>
+          <a:lstStyle/>
+          <a:p>
+            <a:fld id="{3A98EE3D-8CD1-4C3F-BD1C-C98C9596463C}" type="slidenum">
+              <a:rPr lang="en-US" smtClean="0"/>
+              <a:t>8</a:t>
+            </a:fld>
+            <a:endParaRPr lang="en-US" dirty="0"/>
+          </a:p>
+        </p:txBody>
+      </p:sp>
+      <p:pic>
+        <p:nvPicPr>
+          <p:cNvPr id="8" name="Marcador de contenido 7"/>
           <p:cNvPicPr>
             <a:picLocks noGrp="1" noChangeAspect="1"/>
           </p:cNvPicPr>
@@ -10054,72 +9588,14 @@
         </p:blipFill>
         <p:spPr>
           <a:xfrm>
-            <a:off x="1373428" y="2011363"/>
-            <a:ext cx="9443557" cy="4206875"/>
+            <a:off x="1889159" y="2244126"/>
+            <a:ext cx="7715250" cy="3276600"/>
           </a:xfrm>
           <a:prstGeom prst="rect">
             <a:avLst/>
           </a:prstGeom>
         </p:spPr>
       </p:pic>
-      <p:sp>
-        <p:nvSpPr>
-          <p:cNvPr id="4" name="Marcador de pie de página 3">
-            <a:extLst>
-              <a:ext uri="{FF2B5EF4-FFF2-40B4-BE49-F238E27FC236}">
-                <a16:creationId xmlns:a16="http://schemas.microsoft.com/office/drawing/2014/main" id="{71425969-D9F1-4AD9-AD3A-DD04E882EC19}"/>
-              </a:ext>
-            </a:extLst>
-          </p:cNvPr>
-          <p:cNvSpPr>
-            <a:spLocks noGrp="1"/>
-          </p:cNvSpPr>
-          <p:nvPr>
-            <p:ph type="ftr" sz="quarter" idx="11"/>
-          </p:nvPr>
-        </p:nvSpPr>
-        <p:spPr/>
-        <p:txBody>
-          <a:bodyPr/>
-          <a:lstStyle/>
-          <a:p>
-            <a:r>
-              <a:rPr lang="en-US"/>
-              <a:t>November 26th, 2019</a:t>
-            </a:r>
-            <a:endParaRPr lang="en-US" dirty="0"/>
-          </a:p>
-        </p:txBody>
-      </p:sp>
-      <p:sp>
-        <p:nvSpPr>
-          <p:cNvPr id="5" name="Marcador de número de diapositiva 4">
-            <a:extLst>
-              <a:ext uri="{FF2B5EF4-FFF2-40B4-BE49-F238E27FC236}">
-                <a16:creationId xmlns:a16="http://schemas.microsoft.com/office/drawing/2014/main" id="{64A3C2AA-7BA2-426F-B970-2480DA90A086}"/>
-              </a:ext>
-            </a:extLst>
-          </p:cNvPr>
-          <p:cNvSpPr>
-            <a:spLocks noGrp="1"/>
-          </p:cNvSpPr>
-          <p:nvPr>
-            <p:ph type="sldNum" sz="quarter" idx="12"/>
-          </p:nvPr>
-        </p:nvSpPr>
-        <p:spPr/>
-        <p:txBody>
-          <a:bodyPr/>
-          <a:lstStyle/>
-          <a:p>
-            <a:fld id="{3A98EE3D-8CD1-4C3F-BD1C-C98C9596463C}" type="slidenum">
-              <a:rPr lang="en-US" smtClean="0"/>
-              <a:t>8</a:t>
-            </a:fld>
-            <a:endParaRPr lang="en-US" dirty="0"/>
-          </a:p>
-        </p:txBody>
-      </p:sp>
     </p:spTree>
     <p:extLst>
       <p:ext uri="{BB962C8B-B14F-4D97-AF65-F5344CB8AC3E}">
@@ -10207,7 +9683,96 @@
           <a:bodyPr/>
           <a:lstStyle/>
           <a:p>
-            <a:endParaRPr lang="en-US"/>
+            <a:r>
+              <a:rPr lang="en-US" dirty="0"/>
+              <a:t>In our study case we analyze star wars tweets because it is a controversial topic since </a:t>
+            </a:r>
+            <a:r>
+              <a:rPr lang="en-US" dirty="0" smtClean="0"/>
+              <a:t>the star wars is characterized for having one of the most toxic and loudest fandoms.</a:t>
+            </a:r>
+          </a:p>
+          <a:p>
+            <a:r>
+              <a:rPr lang="en-US" dirty="0" smtClean="0"/>
+              <a:t>Star wars fandom is a multi generation franchise and every movie has a different perspective .</a:t>
+            </a:r>
+          </a:p>
+          <a:p>
+            <a:r>
+              <a:rPr lang="en-US" dirty="0" smtClean="0"/>
+              <a:t>There are movies and characters in the past like Ahmed Best (jar jar) that suffer from criticism and harassment to the point that he contemplates suicide.</a:t>
+            </a:r>
+          </a:p>
+          <a:p>
+            <a:r>
+              <a:rPr lang="en-US" dirty="0" smtClean="0"/>
+              <a:t> The three main characters are </a:t>
+            </a:r>
+            <a:r>
+              <a:rPr lang="es-MX" dirty="0"/>
+              <a:t>Daisy </a:t>
+            </a:r>
+            <a:r>
+              <a:rPr lang="es-MX" dirty="0" err="1" smtClean="0"/>
+              <a:t>Ridley</a:t>
+            </a:r>
+            <a:r>
+              <a:rPr lang="en-US" dirty="0"/>
+              <a:t> </a:t>
+            </a:r>
+            <a:r>
+              <a:rPr lang="en-US" dirty="0" smtClean="0"/>
+              <a:t>(</a:t>
+            </a:r>
+            <a:r>
+              <a:rPr lang="en-US" dirty="0"/>
+              <a:t>B</a:t>
+            </a:r>
+            <a:r>
+              <a:rPr lang="en-US" dirty="0" smtClean="0"/>
+              <a:t>ritish female</a:t>
+            </a:r>
+            <a:r>
+              <a:rPr lang="en-US" dirty="0"/>
+              <a:t>), Kelly Marie Tran </a:t>
+            </a:r>
+            <a:r>
+              <a:rPr lang="en-US" dirty="0" smtClean="0"/>
+              <a:t>(Asian-American female) </a:t>
+            </a:r>
+            <a:r>
+              <a:rPr lang="en-US" dirty="0"/>
+              <a:t>and a </a:t>
+            </a:r>
+            <a:r>
+              <a:rPr lang="es-ES" dirty="0"/>
+              <a:t>John </a:t>
+            </a:r>
+            <a:r>
+              <a:rPr lang="es-ES" dirty="0" err="1" smtClean="0"/>
+              <a:t>Boyega</a:t>
+            </a:r>
+            <a:r>
+              <a:rPr lang="es-ES" dirty="0"/>
+              <a:t> </a:t>
+            </a:r>
+            <a:r>
+              <a:rPr lang="es-ES" dirty="0" smtClean="0"/>
+              <a:t>(</a:t>
+            </a:r>
+            <a:r>
+              <a:rPr lang="es-ES" dirty="0" err="1" smtClean="0"/>
+              <a:t>Nigerian</a:t>
+            </a:r>
+            <a:r>
+              <a:rPr lang="en-US" dirty="0" smtClean="0"/>
+              <a:t> male) have suffer from massive harassment in the past movies to the point that Daisy and Kelly quit social media.</a:t>
+            </a:r>
+            <a:endParaRPr lang="en-US" dirty="0"/>
+          </a:p>
+          <a:p>
+            <a:endParaRPr lang="en-US" dirty="0"/>
           </a:p>
         </p:txBody>
       </p:sp>

</xml_diff>